<commit_message>
Att Lab 6 21/11
</commit_message>
<xml_diff>
--- a/Revisão Prova 2/Fila, Pilha e Lista.pptx
+++ b/Revisão Prova 2/Fila, Pilha e Lista.pptx
@@ -295,7 +295,7 @@
           <a:p>
             <a:fld id="{6183623B-3354-4CA0-B90E-4CFB71CFED39}" type="datetimeFigureOut">
               <a:rPr lang="pt-BR" smtClean="0"/>
-              <a:t>20/11/2023</a:t>
+              <a:t>21/11/2023</a:t>
             </a:fld>
             <a:endParaRPr lang="pt-BR"/>
           </a:p>
@@ -465,7 +465,7 @@
           <a:p>
             <a:fld id="{6183623B-3354-4CA0-B90E-4CFB71CFED39}" type="datetimeFigureOut">
               <a:rPr lang="pt-BR" smtClean="0"/>
-              <a:t>20/11/2023</a:t>
+              <a:t>21/11/2023</a:t>
             </a:fld>
             <a:endParaRPr lang="pt-BR"/>
           </a:p>
@@ -645,7 +645,7 @@
           <a:p>
             <a:fld id="{6183623B-3354-4CA0-B90E-4CFB71CFED39}" type="datetimeFigureOut">
               <a:rPr lang="pt-BR" smtClean="0"/>
-              <a:t>20/11/2023</a:t>
+              <a:t>21/11/2023</a:t>
             </a:fld>
             <a:endParaRPr lang="pt-BR"/>
           </a:p>
@@ -815,7 +815,7 @@
           <a:p>
             <a:fld id="{6183623B-3354-4CA0-B90E-4CFB71CFED39}" type="datetimeFigureOut">
               <a:rPr lang="pt-BR" smtClean="0"/>
-              <a:t>20/11/2023</a:t>
+              <a:t>21/11/2023</a:t>
             </a:fld>
             <a:endParaRPr lang="pt-BR"/>
           </a:p>
@@ -1061,7 +1061,7 @@
           <a:p>
             <a:fld id="{6183623B-3354-4CA0-B90E-4CFB71CFED39}" type="datetimeFigureOut">
               <a:rPr lang="pt-BR" smtClean="0"/>
-              <a:t>20/11/2023</a:t>
+              <a:t>21/11/2023</a:t>
             </a:fld>
             <a:endParaRPr lang="pt-BR"/>
           </a:p>
@@ -1349,7 +1349,7 @@
           <a:p>
             <a:fld id="{6183623B-3354-4CA0-B90E-4CFB71CFED39}" type="datetimeFigureOut">
               <a:rPr lang="pt-BR" smtClean="0"/>
-              <a:t>20/11/2023</a:t>
+              <a:t>21/11/2023</a:t>
             </a:fld>
             <a:endParaRPr lang="pt-BR"/>
           </a:p>
@@ -1771,7 +1771,7 @@
           <a:p>
             <a:fld id="{6183623B-3354-4CA0-B90E-4CFB71CFED39}" type="datetimeFigureOut">
               <a:rPr lang="pt-BR" smtClean="0"/>
-              <a:t>20/11/2023</a:t>
+              <a:t>21/11/2023</a:t>
             </a:fld>
             <a:endParaRPr lang="pt-BR"/>
           </a:p>
@@ -1889,7 +1889,7 @@
           <a:p>
             <a:fld id="{6183623B-3354-4CA0-B90E-4CFB71CFED39}" type="datetimeFigureOut">
               <a:rPr lang="pt-BR" smtClean="0"/>
-              <a:t>20/11/2023</a:t>
+              <a:t>21/11/2023</a:t>
             </a:fld>
             <a:endParaRPr lang="pt-BR"/>
           </a:p>
@@ -1984,7 +1984,7 @@
           <a:p>
             <a:fld id="{6183623B-3354-4CA0-B90E-4CFB71CFED39}" type="datetimeFigureOut">
               <a:rPr lang="pt-BR" smtClean="0"/>
-              <a:t>20/11/2023</a:t>
+              <a:t>21/11/2023</a:t>
             </a:fld>
             <a:endParaRPr lang="pt-BR"/>
           </a:p>
@@ -2261,7 +2261,7 @@
           <a:p>
             <a:fld id="{6183623B-3354-4CA0-B90E-4CFB71CFED39}" type="datetimeFigureOut">
               <a:rPr lang="pt-BR" smtClean="0"/>
-              <a:t>20/11/2023</a:t>
+              <a:t>21/11/2023</a:t>
             </a:fld>
             <a:endParaRPr lang="pt-BR"/>
           </a:p>
@@ -2514,7 +2514,7 @@
           <a:p>
             <a:fld id="{6183623B-3354-4CA0-B90E-4CFB71CFED39}" type="datetimeFigureOut">
               <a:rPr lang="pt-BR" smtClean="0"/>
-              <a:t>20/11/2023</a:t>
+              <a:t>21/11/2023</a:t>
             </a:fld>
             <a:endParaRPr lang="pt-BR"/>
           </a:p>
@@ -2727,7 +2727,7 @@
           <a:p>
             <a:fld id="{6183623B-3354-4CA0-B90E-4CFB71CFED39}" type="datetimeFigureOut">
               <a:rPr lang="pt-BR" smtClean="0"/>
-              <a:t>20/11/2023</a:t>
+              <a:t>21/11/2023</a:t>
             </a:fld>
             <a:endParaRPr lang="pt-BR"/>
           </a:p>
@@ -4167,6 +4167,13 @@
   <p:clrMapOvr>
     <a:masterClrMapping/>
   </p:clrMapOvr>
+  <p:timing>
+    <p:tnLst>
+      <p:par>
+        <p:cTn id="1" dur="indefinite" restart="never" nodeType="tmRoot"/>
+      </p:par>
+    </p:tnLst>
+  </p:timing>
 </p:sld>
 </file>
 
@@ -8156,6 +8163,55 @@
               <a:t>Lista após a inserção no inicio</a:t>
             </a:r>
             <a:endParaRPr lang="pt-BR" sz="1400" dirty="0"/>
+          </a:p>
+        </p:txBody>
+      </p:sp>
+      <p:sp>
+        <p:nvSpPr>
+          <p:cNvPr id="45" name="Retângulo 44"/>
+          <p:cNvSpPr/>
+          <p:nvPr/>
+        </p:nvSpPr>
+        <p:spPr>
+          <a:xfrm>
+            <a:off x="5724128" y="1256432"/>
+            <a:ext cx="641444" cy="660400"/>
+          </a:xfrm>
+          <a:prstGeom prst="rect">
+            <a:avLst/>
+          </a:prstGeom>
+          <a:noFill/>
+          <a:ln>
+            <a:solidFill>
+              <a:srgbClr val="00B050"/>
+            </a:solidFill>
+          </a:ln>
+        </p:spPr>
+        <p:style>
+          <a:lnRef idx="2">
+            <a:schemeClr val="accent1">
+              <a:shade val="50000"/>
+            </a:schemeClr>
+          </a:lnRef>
+          <a:fillRef idx="1">
+            <a:schemeClr val="accent1"/>
+          </a:fillRef>
+          <a:effectRef idx="0">
+            <a:schemeClr val="accent1"/>
+          </a:effectRef>
+          <a:fontRef idx="minor">
+            <a:schemeClr val="lt1"/>
+          </a:fontRef>
+        </p:style>
+        <p:txBody>
+          <a:bodyPr rtlCol="0" anchor="ctr"/>
+          <a:lstStyle/>
+          <a:p>
+            <a:pPr algn="ctr"/>
+            <a:r>
+              <a:rPr lang="pt-BR" dirty="0"/>
+              <a:t>C</a:t>
+            </a:r>
           </a:p>
         </p:txBody>
       </p:sp>

</xml_diff>